<commit_message>
added new slides for website
</commit_message>
<xml_diff>
--- a/Final_Slide.pptx
+++ b/Final_Slide.pptx
@@ -299,7 +299,7 @@
           <a:p>
             <a:fld id="{C8A432C8-69A7-458B-9684-2BFA64B31948}" type="datetime2">
               <a:rPr lang="en-US" smtClean="0"/>
-              <a:t>Thursday, November 12, 15</a:t>
+              <a:t>Monday, February 1, 16</a:t>
             </a:fld>
             <a:endParaRPr lang="en-US"/>
           </a:p>
@@ -466,7 +466,7 @@
           <a:p>
             <a:fld id="{8CC057FC-95B6-4D89-AFDA-ABA33EE921E5}" type="datetime2">
               <a:rPr lang="en-US" smtClean="0"/>
-              <a:t>Thursday, November 12, 15</a:t>
+              <a:t>Monday, February 1, 16</a:t>
             </a:fld>
             <a:endParaRPr lang="en-US"/>
           </a:p>
@@ -643,7 +643,7 @@
           <a:p>
             <a:fld id="{EC4549AC-EB31-477F-92A9-B1988E232878}" type="datetime2">
               <a:rPr lang="en-US" smtClean="0"/>
-              <a:t>Thursday, November 12, 15</a:t>
+              <a:t>Monday, February 1, 16</a:t>
             </a:fld>
             <a:endParaRPr lang="en-US"/>
           </a:p>
@@ -828,7 +828,7 @@
           <a:p>
             <a:fld id="{6396A3A3-94A6-4E5B-AF39-173ACA3E61CC}" type="datetime2">
               <a:rPr lang="en-US" smtClean="0"/>
-              <a:t>Thursday, November 12, 15</a:t>
+              <a:t>Monday, February 1, 16</a:t>
             </a:fld>
             <a:endParaRPr lang="en-US"/>
           </a:p>
@@ -1092,7 +1092,7 @@
           <a:p>
             <a:fld id="{9933D019-A32C-4EAD-B8E6-DBDA699692FD}" type="datetime2">
               <a:rPr lang="en-US" smtClean="0"/>
-              <a:t>Thursday, November 12, 15</a:t>
+              <a:t>Monday, February 1, 16</a:t>
             </a:fld>
             <a:endParaRPr lang="en-US"/>
           </a:p>
@@ -1442,7 +1442,7 @@
           <a:p>
             <a:fld id="{CCEBA98F-560C-4997-81C4-81D4D9187EAB}" type="datetime2">
               <a:rPr lang="en-US" smtClean="0"/>
-              <a:t>Thursday, November 12, 15</a:t>
+              <a:t>Monday, February 1, 16</a:t>
             </a:fld>
             <a:endParaRPr lang="en-US"/>
           </a:p>
@@ -1752,7 +1752,7 @@
           <a:p>
             <a:fld id="{150972B2-CA5C-437D-87D0-8081271A9E4B}" type="datetime2">
               <a:rPr lang="en-US" smtClean="0"/>
-              <a:t>Thursday, November 12, 15</a:t>
+              <a:t>Monday, February 1, 16</a:t>
             </a:fld>
             <a:endParaRPr lang="en-US"/>
           </a:p>
@@ -1981,7 +1981,7 @@
           <a:p>
             <a:fld id="{79CD4847-11EF-4466-A8AD-85CDB7B49118}" type="datetime2">
               <a:rPr lang="en-US" smtClean="0"/>
-              <a:t>Thursday, November 12, 15</a:t>
+              <a:t>Monday, February 1, 16</a:t>
             </a:fld>
             <a:endParaRPr lang="en-US"/>
           </a:p>
@@ -2073,7 +2073,7 @@
           <a:p>
             <a:fld id="{F168457A-3AB9-4880-8A0C-9F8524491207}" type="datetime2">
               <a:rPr lang="en-US" smtClean="0"/>
-              <a:t>Thursday, November 12, 15</a:t>
+              <a:t>Monday, February 1, 16</a:t>
             </a:fld>
             <a:endParaRPr lang="en-US"/>
           </a:p>
@@ -2363,7 +2363,7 @@
           <a:p>
             <a:fld id="{3FE976D3-5B7F-4300-ABED-C91F1B2AE209}" type="datetime2">
               <a:rPr lang="en-US" smtClean="0"/>
-              <a:t>Thursday, November 12, 15</a:t>
+              <a:t>Monday, February 1, 16</a:t>
             </a:fld>
             <a:endParaRPr lang="en-US"/>
           </a:p>
@@ -2634,7 +2634,7 @@
           <a:p>
             <a:fld id="{EBDC1E59-17DD-41CE-97CA-624A472382D4}" type="datetime2">
               <a:rPr lang="en-US" smtClean="0"/>
-              <a:t>Thursday, November 12, 15</a:t>
+              <a:t>Monday, February 1, 16</a:t>
             </a:fld>
             <a:endParaRPr lang="en-US"/>
           </a:p>
@@ -2846,7 +2846,7 @@
           <a:p>
             <a:fld id="{A80CB818-7379-467D-8E76-EF9D9074A26C}" type="datetime2">
               <a:rPr lang="en-US" smtClean="0"/>
-              <a:t>Thursday, November 12, 15</a:t>
+              <a:t>Monday, February 1, 16</a:t>
             </a:fld>
             <a:endParaRPr lang="en-US" dirty="0"/>
           </a:p>
@@ -3369,117 +3369,6 @@
       </p:grpSpPr>
       <p:sp>
         <p:nvSpPr>
-          <p:cNvPr id="2" name="Title 1"/>
-          <p:cNvSpPr>
-            <a:spLocks noGrp="1"/>
-          </p:cNvSpPr>
-          <p:nvPr>
-            <p:ph type="ctrTitle"/>
-          </p:nvPr>
-        </p:nvSpPr>
-        <p:spPr>
-          <a:xfrm>
-            <a:off x="154475" y="93397"/>
-            <a:ext cx="2020080" cy="497670"/>
-          </a:xfrm>
-        </p:spPr>
-        <p:txBody>
-          <a:bodyPr/>
-          <a:lstStyle/>
-          <a:p>
-            <a:pPr algn="l"/>
-            <a:r>
-              <a:rPr lang="en-US" sz="3600" dirty="0" smtClean="0"/>
-              <a:t>Progress</a:t>
-            </a:r>
-            <a:endParaRPr lang="en-US" sz="3600" dirty="0"/>
-          </a:p>
-        </p:txBody>
-      </p:sp>
-      <p:sp>
-        <p:nvSpPr>
-          <p:cNvPr id="8" name="TextBox 7"/>
-          <p:cNvSpPr txBox="1"/>
-          <p:nvPr/>
-        </p:nvSpPr>
-        <p:spPr>
-          <a:xfrm>
-            <a:off x="154474" y="585379"/>
-            <a:ext cx="8989526" cy="3108544"/>
-          </a:xfrm>
-          <a:prstGeom prst="rect">
-            <a:avLst/>
-          </a:prstGeom>
-          <a:noFill/>
-        </p:spPr>
-        <p:txBody>
-          <a:bodyPr wrap="square" rtlCol="0">
-            <a:spAutoFit/>
-          </a:bodyPr>
-          <a:lstStyle/>
-          <a:p>
-            <a:pPr marL="571500" indent="-571500">
-              <a:buFont typeface="+mj-lt"/>
-              <a:buAutoNum type="romanUcPeriod"/>
-            </a:pPr>
-            <a:r>
-              <a:rPr lang="en-US" sz="2800" dirty="0" smtClean="0"/>
-              <a:t> Concept Defined</a:t>
-            </a:r>
-          </a:p>
-          <a:p>
-            <a:pPr marL="571500" indent="-571500">
-              <a:buFont typeface="+mj-lt"/>
-              <a:buAutoNum type="romanUcPeriod"/>
-            </a:pPr>
-            <a:r>
-              <a:rPr lang="en-US" sz="2800" dirty="0" smtClean="0"/>
-              <a:t> Robust Data Set Acquired (lengthy process)</a:t>
-            </a:r>
-          </a:p>
-          <a:p>
-            <a:pPr marL="571500" indent="-571500">
-              <a:buFont typeface="+mj-lt"/>
-              <a:buAutoNum type="romanUcPeriod"/>
-            </a:pPr>
-            <a:r>
-              <a:rPr lang="en-US" sz="2800" dirty="0" smtClean="0"/>
-              <a:t> Research Completed</a:t>
-            </a:r>
-          </a:p>
-          <a:p>
-            <a:pPr marL="1028700" lvl="1" indent="-571500">
-              <a:buFont typeface="+mj-lt"/>
-              <a:buAutoNum type="arabicPeriod"/>
-            </a:pPr>
-            <a:r>
-              <a:rPr lang="en-US" sz="2800" dirty="0" smtClean="0"/>
-              <a:t>Identified litigation predictors, precedence for study, and types of data to use.</a:t>
-            </a:r>
-          </a:p>
-          <a:p>
-            <a:pPr marL="571500" indent="-571500">
-              <a:buFont typeface="+mj-lt"/>
-              <a:buAutoNum type="romanUcPeriod"/>
-            </a:pPr>
-            <a:r>
-              <a:rPr lang="en-US" sz="2800" dirty="0" smtClean="0"/>
-              <a:t>Code written to Parse and manipulate </a:t>
-            </a:r>
-            <a:r>
-              <a:rPr lang="en-US" sz="2800" dirty="0" err="1" smtClean="0"/>
-              <a:t>xmls</a:t>
-            </a:r>
-            <a:r>
-              <a:rPr lang="en-US" sz="2800" dirty="0" smtClean="0"/>
-              <a:t> and subsequent exploratory data analysis Completed. </a:t>
-            </a:r>
-            <a:endParaRPr lang="en-US" sz="2800" dirty="0" smtClean="0"/>
-          </a:p>
-        </p:txBody>
-      </p:sp>
-      <p:sp>
-        <p:nvSpPr>
           <p:cNvPr id="4" name="Title 1"/>
           <p:cNvSpPr txBox="1">
             <a:spLocks/>
@@ -3488,7 +3377,7 @@
         </p:nvSpPr>
         <p:spPr>
           <a:xfrm>
-            <a:off x="154474" y="3869290"/>
+            <a:off x="154474" y="327369"/>
             <a:ext cx="3846705" cy="497670"/>
           </a:xfrm>
           <a:prstGeom prst="rect">
@@ -3543,8 +3432,8 @@
         </p:nvSpPr>
         <p:spPr>
           <a:xfrm>
-            <a:off x="154474" y="4347745"/>
-            <a:ext cx="8989526" cy="2246769"/>
+            <a:off x="154474" y="1539252"/>
+            <a:ext cx="8989526" cy="3970318"/>
           </a:xfrm>
           <a:prstGeom prst="rect">
             <a:avLst/>
@@ -3559,43 +3448,69 @@
           <a:p>
             <a:pPr marL="571500" indent="-571500">
               <a:buFont typeface="+mj-lt"/>
-              <a:buAutoNum type="romanUcPeriod"/>
+              <a:buAutoNum type="arabicPeriod"/>
             </a:pPr>
             <a:r>
               <a:rPr lang="en-US" sz="2800" dirty="0" smtClean="0"/>
-              <a:t>Mine data on acquired patent characteristics.</a:t>
+              <a:t>Divide legal event data into testing and training sets and build a predictive model of litigation.</a:t>
+            </a:r>
+          </a:p>
+          <a:p>
+            <a:pPr marL="1028700" lvl="1" indent="-571500">
+              <a:buFont typeface="+mj-lt"/>
+              <a:buAutoNum type="alphaLcPeriod"/>
+            </a:pPr>
+            <a:r>
+              <a:rPr lang="en-US" sz="2800" dirty="0" smtClean="0"/>
+              <a:t>Candidate models </a:t>
+            </a:r>
+            <a:r>
+              <a:rPr lang="en-US" sz="2800" dirty="0" smtClean="0"/>
+              <a:t>include </a:t>
+            </a:r>
+            <a:r>
+              <a:rPr lang="en-US" sz="2800" dirty="0" smtClean="0"/>
+              <a:t>logistic regression or decision tree type classifiers.  </a:t>
             </a:r>
           </a:p>
           <a:p>
             <a:pPr marL="571500" indent="-571500">
               <a:buFont typeface="+mj-lt"/>
-              <a:buAutoNum type="romanUcPeriod"/>
+              <a:buAutoNum type="arabicPeriod"/>
             </a:pPr>
             <a:r>
               <a:rPr lang="en-US" sz="2800" dirty="0" smtClean="0"/>
-              <a:t>Divide data into testing and training sets and build a predictive model of litigation.</a:t>
+              <a:t>Validate model.</a:t>
             </a:r>
           </a:p>
           <a:p>
             <a:pPr marL="571500" indent="-571500">
               <a:buFont typeface="+mj-lt"/>
-              <a:buAutoNum type="romanUcPeriod"/>
+              <a:buAutoNum type="arabicPeriod"/>
             </a:pPr>
             <a:r>
               <a:rPr lang="en-US" sz="2800" dirty="0" smtClean="0"/>
-              <a:t>Validate model.</a:t>
-            </a:r>
+              <a:t>Make predictions on testing set and complete web app.  </a:t>
+            </a:r>
+            <a:endParaRPr lang="en-US" sz="2800" dirty="0" smtClean="0"/>
           </a:p>
           <a:p>
             <a:pPr marL="571500" indent="-571500">
               <a:buFont typeface="+mj-lt"/>
-              <a:buAutoNum type="romanUcPeriod"/>
+              <a:buAutoNum type="arabicPeriod"/>
             </a:pPr>
-            <a:r>
-              <a:rPr lang="en-US" sz="2800" dirty="0" smtClean="0"/>
-              <a:t>Write report &amp; prepare presentation.</a:t>
-            </a:r>
-            <a:endParaRPr lang="en-US" sz="2800" dirty="0" smtClean="0"/>
+            <a:endParaRPr lang="en-US" sz="2800" dirty="0"/>
+          </a:p>
+          <a:p>
+            <a:r>
+              <a:rPr lang="en-US" sz="2800" b="1" dirty="0" smtClean="0"/>
+              <a:t>Website</a:t>
+            </a:r>
+            <a:r>
+              <a:rPr lang="en-US" sz="2800" b="1" dirty="0"/>
+              <a:t>:  https://dataincswami2015.herokuapp.com/</a:t>
+            </a:r>
+            <a:endParaRPr lang="en-US" sz="2800" b="1" dirty="0" smtClean="0"/>
           </a:p>
         </p:txBody>
       </p:sp>

</xml_diff>